<commit_message>
poprawione prezentacje SSDT i GitHub
</commit_message>
<xml_diff>
--- a/DEVSQL_00_Intro/DEVSQL_00B_SSDT.pptx
+++ b/DEVSQL_00_Intro/DEVSQL_00B_SSDT.pptx
@@ -5,7 +5,7 @@
     <p:sldMasterId id="2147483903" r:id="rId1"/>
   </p:sldMasterIdLst>
   <p:notesMasterIdLst>
-    <p:notesMasterId r:id="rId20"/>
+    <p:notesMasterId r:id="rId21"/>
   </p:notesMasterIdLst>
   <p:sldIdLst>
     <p:sldId id="256" r:id="rId2"/>
@@ -26,6 +26,7 @@
     <p:sldId id="274" r:id="rId17"/>
     <p:sldId id="275" r:id="rId18"/>
     <p:sldId id="276" r:id="rId19"/>
+    <p:sldId id="277" r:id="rId20"/>
   </p:sldIdLst>
   <p:sldSz cx="12192000" cy="6858000"/>
   <p:notesSz cx="6858000" cy="9144000"/>
@@ -4244,7 +4245,7 @@
         </p:blipFill>
         <p:spPr>
           <a:xfrm>
-            <a:off x="782794" y="660149"/>
+            <a:off x="1169405" y="1302700"/>
             <a:ext cx="6353175" cy="3962400"/>
           </a:xfrm>
           <a:prstGeom prst="rect">
@@ -4262,6 +4263,35 @@
           </a:effectLst>
         </p:spPr>
       </p:pic>
+      <p:sp>
+        <p:nvSpPr>
+          <p:cNvPr id="5" name="Rectangle 4"/>
+          <p:cNvSpPr/>
+          <p:nvPr/>
+        </p:nvSpPr>
+        <p:spPr>
+          <a:xfrm>
+            <a:off x="1169405" y="654776"/>
+            <a:ext cx="5041272" cy="338554"/>
+          </a:xfrm>
+          <a:prstGeom prst="rect">
+            <a:avLst/>
+          </a:prstGeom>
+        </p:spPr>
+        <p:txBody>
+          <a:bodyPr wrap="square">
+            <a:spAutoFit/>
+          </a:bodyPr>
+          <a:lstStyle/>
+          <a:p>
+            <a:r>
+              <a:rPr lang="pl-PL" sz="1600" b="1" dirty="0" smtClean="0"/>
+              <a:t>Create project:</a:t>
+            </a:r>
+            <a:endParaRPr lang="pl-PL" sz="1600" dirty="0"/>
+          </a:p>
+        </p:txBody>
+      </p:sp>
     </p:spTree>
     <p:extLst>
       <p:ext uri="{BB962C8B-B14F-4D97-AF65-F5344CB8AC3E}">
@@ -4354,8 +4384,8 @@
         </p:blipFill>
         <p:spPr>
           <a:xfrm>
-            <a:off x="797082" y="552262"/>
-            <a:ext cx="6957947" cy="5372901"/>
+            <a:off x="1169405" y="988391"/>
+            <a:ext cx="6230343" cy="4811048"/>
           </a:xfrm>
           <a:prstGeom prst="rect">
             <a:avLst/>
@@ -4372,6 +4402,35 @@
           </a:effectLst>
         </p:spPr>
       </p:pic>
+      <p:sp>
+        <p:nvSpPr>
+          <p:cNvPr id="5" name="Rectangle 4"/>
+          <p:cNvSpPr/>
+          <p:nvPr/>
+        </p:nvSpPr>
+        <p:spPr>
+          <a:xfrm>
+            <a:off x="1169405" y="654776"/>
+            <a:ext cx="5041272" cy="338554"/>
+          </a:xfrm>
+          <a:prstGeom prst="rect">
+            <a:avLst/>
+          </a:prstGeom>
+        </p:spPr>
+        <p:txBody>
+          <a:bodyPr wrap="square">
+            <a:spAutoFit/>
+          </a:bodyPr>
+          <a:lstStyle/>
+          <a:p>
+            <a:r>
+              <a:rPr lang="pl-PL" sz="1600" b="1" dirty="0" smtClean="0"/>
+              <a:t>SQL/S DB Project:</a:t>
+            </a:r>
+            <a:endParaRPr lang="pl-PL" sz="1600" dirty="0"/>
+          </a:p>
+        </p:txBody>
+      </p:sp>
     </p:spTree>
     <p:extLst>
       <p:ext uri="{BB962C8B-B14F-4D97-AF65-F5344CB8AC3E}">
@@ -4464,8 +4523,8 @@
         </p:blipFill>
         <p:spPr>
           <a:xfrm>
-            <a:off x="1501380" y="706169"/>
-            <a:ext cx="2099575" cy="5391339"/>
+            <a:off x="1169406" y="993330"/>
+            <a:ext cx="1810712" cy="4649589"/>
           </a:xfrm>
           <a:prstGeom prst="rect">
             <a:avLst/>
@@ -4498,8 +4557,8 @@
         </p:blipFill>
         <p:spPr>
           <a:xfrm>
-            <a:off x="4523055" y="706169"/>
-            <a:ext cx="4762593" cy="5224273"/>
+            <a:off x="3567466" y="993330"/>
+            <a:ext cx="4238695" cy="4649589"/>
           </a:xfrm>
           <a:prstGeom prst="rect">
             <a:avLst/>
@@ -4516,6 +4575,35 @@
           </a:effectLst>
         </p:spPr>
       </p:pic>
+      <p:sp>
+        <p:nvSpPr>
+          <p:cNvPr id="7" name="Rectangle 6"/>
+          <p:cNvSpPr/>
+          <p:nvPr/>
+        </p:nvSpPr>
+        <p:spPr>
+          <a:xfrm>
+            <a:off x="1169405" y="654776"/>
+            <a:ext cx="5041272" cy="338554"/>
+          </a:xfrm>
+          <a:prstGeom prst="rect">
+            <a:avLst/>
+          </a:prstGeom>
+        </p:spPr>
+        <p:txBody>
+          <a:bodyPr wrap="square">
+            <a:spAutoFit/>
+          </a:bodyPr>
+          <a:lstStyle/>
+          <a:p>
+            <a:r>
+              <a:rPr lang="pl-PL" sz="1600" b="1" dirty="0" smtClean="0"/>
+              <a:t>Schema Compare:</a:t>
+            </a:r>
+            <a:endParaRPr lang="pl-PL" sz="1600" dirty="0"/>
+          </a:p>
+        </p:txBody>
+      </p:sp>
     </p:spTree>
     <p:extLst>
       <p:ext uri="{BB962C8B-B14F-4D97-AF65-F5344CB8AC3E}">
@@ -4608,7 +4696,7 @@
         </p:blipFill>
         <p:spPr>
           <a:xfrm>
-            <a:off x="1203442" y="454180"/>
+            <a:off x="1169405" y="993330"/>
             <a:ext cx="9349212" cy="1327859"/>
           </a:xfrm>
           <a:prstGeom prst="rect">
@@ -4642,8 +4730,8 @@
         </p:blipFill>
         <p:spPr>
           <a:xfrm>
-            <a:off x="1871663" y="1964602"/>
-            <a:ext cx="6213496" cy="4574310"/>
+            <a:off x="1169405" y="2469746"/>
+            <a:ext cx="5077561" cy="3738047"/>
           </a:xfrm>
           <a:prstGeom prst="rect">
             <a:avLst/>
@@ -4660,6 +4748,35 @@
           </a:effectLst>
         </p:spPr>
       </p:pic>
+      <p:sp>
+        <p:nvSpPr>
+          <p:cNvPr id="6" name="Rectangle 5"/>
+          <p:cNvSpPr/>
+          <p:nvPr/>
+        </p:nvSpPr>
+        <p:spPr>
+          <a:xfrm>
+            <a:off x="1169405" y="654776"/>
+            <a:ext cx="5041272" cy="338554"/>
+          </a:xfrm>
+          <a:prstGeom prst="rect">
+            <a:avLst/>
+          </a:prstGeom>
+        </p:spPr>
+        <p:txBody>
+          <a:bodyPr wrap="square">
+            <a:spAutoFit/>
+          </a:bodyPr>
+          <a:lstStyle/>
+          <a:p>
+            <a:r>
+              <a:rPr lang="pl-PL" sz="1600" b="1" dirty="0" smtClean="0"/>
+              <a:t>Schema Compare:</a:t>
+            </a:r>
+            <a:endParaRPr lang="pl-PL" sz="1600" dirty="0"/>
+          </a:p>
+        </p:txBody>
+      </p:sp>
     </p:spTree>
     <p:extLst>
       <p:ext uri="{BB962C8B-B14F-4D97-AF65-F5344CB8AC3E}">
@@ -4752,7 +4869,7 @@
         </p:blipFill>
         <p:spPr>
           <a:xfrm>
-            <a:off x="2083382" y="651850"/>
+            <a:off x="1169405" y="993330"/>
             <a:ext cx="7837780" cy="4863408"/>
           </a:xfrm>
           <a:prstGeom prst="rect">
@@ -4770,6 +4887,35 @@
           </a:effectLst>
         </p:spPr>
       </p:pic>
+      <p:sp>
+        <p:nvSpPr>
+          <p:cNvPr id="5" name="Rectangle 4"/>
+          <p:cNvSpPr/>
+          <p:nvPr/>
+        </p:nvSpPr>
+        <p:spPr>
+          <a:xfrm>
+            <a:off x="1169405" y="654776"/>
+            <a:ext cx="5041272" cy="338554"/>
+          </a:xfrm>
+          <a:prstGeom prst="rect">
+            <a:avLst/>
+          </a:prstGeom>
+        </p:spPr>
+        <p:txBody>
+          <a:bodyPr wrap="square">
+            <a:spAutoFit/>
+          </a:bodyPr>
+          <a:lstStyle/>
+          <a:p>
+            <a:r>
+              <a:rPr lang="pl-PL" sz="1600" b="1" dirty="0" smtClean="0"/>
+              <a:t>Compare &amp; Update:</a:t>
+            </a:r>
+            <a:endParaRPr lang="pl-PL" sz="1600" dirty="0"/>
+          </a:p>
+        </p:txBody>
+      </p:sp>
     </p:spTree>
     <p:extLst>
       <p:ext uri="{BB962C8B-B14F-4D97-AF65-F5344CB8AC3E}">
@@ -4862,8 +5008,8 @@
         </p:blipFill>
         <p:spPr>
           <a:xfrm>
-            <a:off x="1058218" y="488887"/>
-            <a:ext cx="8496009" cy="5747300"/>
+            <a:off x="1169406" y="993330"/>
+            <a:ext cx="7116860" cy="4814346"/>
           </a:xfrm>
           <a:prstGeom prst="rect">
             <a:avLst/>
@@ -4880,6 +5026,35 @@
           </a:effectLst>
         </p:spPr>
       </p:pic>
+      <p:sp>
+        <p:nvSpPr>
+          <p:cNvPr id="5" name="Rectangle 4"/>
+          <p:cNvSpPr/>
+          <p:nvPr/>
+        </p:nvSpPr>
+        <p:spPr>
+          <a:xfrm>
+            <a:off x="1169405" y="654776"/>
+            <a:ext cx="5041272" cy="338554"/>
+          </a:xfrm>
+          <a:prstGeom prst="rect">
+            <a:avLst/>
+          </a:prstGeom>
+        </p:spPr>
+        <p:txBody>
+          <a:bodyPr wrap="square">
+            <a:spAutoFit/>
+          </a:bodyPr>
+          <a:lstStyle/>
+          <a:p>
+            <a:r>
+              <a:rPr lang="pl-PL" sz="1600" b="1" dirty="0" smtClean="0"/>
+              <a:t>Check Objects in the project:</a:t>
+            </a:r>
+            <a:endParaRPr lang="pl-PL" sz="1600" dirty="0"/>
+          </a:p>
+        </p:txBody>
+      </p:sp>
     </p:spTree>
     <p:extLst>
       <p:ext uri="{BB962C8B-B14F-4D97-AF65-F5344CB8AC3E}">
@@ -4956,10 +5131,220 @@
           </a:p>
         </p:txBody>
       </p:sp>
+      <p:pic>
+        <p:nvPicPr>
+          <p:cNvPr id="4" name="Picture 3"/>
+          <p:cNvPicPr>
+            <a:picLocks noChangeAspect="1"/>
+          </p:cNvPicPr>
+          <p:nvPr/>
+        </p:nvPicPr>
+        <p:blipFill>
+          <a:blip r:embed="rId2"/>
+          <a:stretch>
+            <a:fillRect/>
+          </a:stretch>
+        </p:blipFill>
+        <p:spPr>
+          <a:xfrm>
+            <a:off x="1169405" y="993330"/>
+            <a:ext cx="6238875" cy="3933825"/>
+          </a:xfrm>
+          <a:prstGeom prst="rect">
+            <a:avLst/>
+          </a:prstGeom>
+          <a:ln>
+            <a:noFill/>
+          </a:ln>
+          <a:effectLst>
+            <a:outerShdw blurRad="292100" dist="139700" dir="2700000" algn="tl" rotWithShape="0">
+              <a:srgbClr val="333333">
+                <a:alpha val="65000"/>
+              </a:srgbClr>
+            </a:outerShdw>
+          </a:effectLst>
+        </p:spPr>
+      </p:pic>
+      <p:sp>
+        <p:nvSpPr>
+          <p:cNvPr id="5" name="Rectangle 4"/>
+          <p:cNvSpPr/>
+          <p:nvPr/>
+        </p:nvSpPr>
+        <p:spPr>
+          <a:xfrm>
+            <a:off x="1169405" y="654776"/>
+            <a:ext cx="5041272" cy="338554"/>
+          </a:xfrm>
+          <a:prstGeom prst="rect">
+            <a:avLst/>
+          </a:prstGeom>
+        </p:spPr>
+        <p:txBody>
+          <a:bodyPr wrap="square">
+            <a:spAutoFit/>
+          </a:bodyPr>
+          <a:lstStyle/>
+          <a:p>
+            <a:r>
+              <a:rPr lang="pl-PL" sz="1600" b="1" dirty="0" smtClean="0"/>
+              <a:t>Alter objects in the DB, add new Schema/Table</a:t>
+            </a:r>
+            <a:r>
+              <a:rPr lang="pl-PL" sz="1600" b="1" dirty="0" smtClean="0"/>
+              <a:t>:</a:t>
+            </a:r>
+            <a:endParaRPr lang="pl-PL" sz="1600" dirty="0"/>
+          </a:p>
+        </p:txBody>
+      </p:sp>
     </p:spTree>
     <p:extLst>
       <p:ext uri="{BB962C8B-B14F-4D97-AF65-F5344CB8AC3E}">
         <p14:creationId xmlns:p14="http://schemas.microsoft.com/office/powerpoint/2010/main" val="2332302448"/>
+      </p:ext>
+    </p:extLst>
+  </p:cSld>
+  <p:clrMapOvr>
+    <a:masterClrMapping/>
+  </p:clrMapOvr>
+</p:sld>
+</file>
+
+<file path=ppt/slides/slide19.xml><?xml version="1.0" encoding="utf-8"?>
+<p:sld xmlns:a="http://schemas.openxmlformats.org/drawingml/2006/main" xmlns:r="http://schemas.openxmlformats.org/officeDocument/2006/relationships" xmlns:p="http://schemas.openxmlformats.org/presentationml/2006/main">
+  <p:cSld>
+    <p:spTree>
+      <p:nvGrpSpPr>
+        <p:cNvPr id="1" name=""/>
+        <p:cNvGrpSpPr/>
+        <p:nvPr/>
+      </p:nvGrpSpPr>
+      <p:grpSpPr>
+        <a:xfrm>
+          <a:off x="0" y="0"/>
+          <a:ext cx="0" cy="0"/>
+          <a:chOff x="0" y="0"/>
+          <a:chExt cx="0" cy="0"/>
+        </a:xfrm>
+      </p:grpSpPr>
+      <p:sp>
+        <p:nvSpPr>
+          <p:cNvPr id="2" name="Footer Placeholder 1"/>
+          <p:cNvSpPr>
+            <a:spLocks noGrp="1"/>
+          </p:cNvSpPr>
+          <p:nvPr>
+            <p:ph type="ftr" sz="quarter" idx="11"/>
+          </p:nvPr>
+        </p:nvSpPr>
+        <p:spPr/>
+        <p:txBody>
+          <a:bodyPr/>
+          <a:lstStyle/>
+          <a:p>
+            <a:r>
+              <a:rPr lang="en-US" smtClean="0"/>
+              <a:t>Developing SQL Databases</a:t>
+            </a:r>
+            <a:endParaRPr lang="en-US" dirty="0"/>
+          </a:p>
+        </p:txBody>
+      </p:sp>
+      <p:sp>
+        <p:nvSpPr>
+          <p:cNvPr id="3" name="Slide Number Placeholder 2"/>
+          <p:cNvSpPr>
+            <a:spLocks noGrp="1"/>
+          </p:cNvSpPr>
+          <p:nvPr>
+            <p:ph type="sldNum" sz="quarter" idx="12"/>
+          </p:nvPr>
+        </p:nvSpPr>
+        <p:spPr/>
+        <p:txBody>
+          <a:bodyPr/>
+          <a:lstStyle/>
+          <a:p>
+            <a:fld id="{4FAB73BC-B049-4115-A692-8D63A059BFB8}" type="slidenum">
+              <a:rPr lang="en-US" smtClean="0"/>
+              <a:t>19</a:t>
+            </a:fld>
+            <a:endParaRPr lang="en-US" dirty="0"/>
+          </a:p>
+        </p:txBody>
+      </p:sp>
+      <p:pic>
+        <p:nvPicPr>
+          <p:cNvPr id="4" name="Picture 3"/>
+          <p:cNvPicPr>
+            <a:picLocks noChangeAspect="1"/>
+          </p:cNvPicPr>
+          <p:nvPr/>
+        </p:nvPicPr>
+        <p:blipFill>
+          <a:blip r:embed="rId2"/>
+          <a:stretch>
+            <a:fillRect/>
+          </a:stretch>
+        </p:blipFill>
+        <p:spPr>
+          <a:xfrm>
+            <a:off x="1169405" y="993330"/>
+            <a:ext cx="8053182" cy="4720281"/>
+          </a:xfrm>
+          <a:prstGeom prst="rect">
+            <a:avLst/>
+          </a:prstGeom>
+          <a:ln>
+            <a:noFill/>
+          </a:ln>
+          <a:effectLst>
+            <a:outerShdw blurRad="292100" dist="139700" dir="2700000" algn="tl" rotWithShape="0">
+              <a:srgbClr val="333333">
+                <a:alpha val="65000"/>
+              </a:srgbClr>
+            </a:outerShdw>
+          </a:effectLst>
+        </p:spPr>
+      </p:pic>
+      <p:sp>
+        <p:nvSpPr>
+          <p:cNvPr id="5" name="Rectangle 4"/>
+          <p:cNvSpPr/>
+          <p:nvPr/>
+        </p:nvSpPr>
+        <p:spPr>
+          <a:xfrm>
+            <a:off x="1169405" y="654776"/>
+            <a:ext cx="5041272" cy="338554"/>
+          </a:xfrm>
+          <a:prstGeom prst="rect">
+            <a:avLst/>
+          </a:prstGeom>
+        </p:spPr>
+        <p:txBody>
+          <a:bodyPr wrap="square">
+            <a:spAutoFit/>
+          </a:bodyPr>
+          <a:lstStyle/>
+          <a:p>
+            <a:r>
+              <a:rPr lang="pl-PL" sz="1600" b="1" dirty="0" smtClean="0"/>
+              <a:t>Compare &amp; Update</a:t>
+            </a:r>
+            <a:r>
+              <a:rPr lang="pl-PL" sz="1600" b="1" dirty="0" smtClean="0"/>
+              <a:t>:</a:t>
+            </a:r>
+            <a:endParaRPr lang="pl-PL" sz="1600" dirty="0"/>
+          </a:p>
+        </p:txBody>
+      </p:sp>
+    </p:spTree>
+    <p:extLst>
+      <p:ext uri="{BB962C8B-B14F-4D97-AF65-F5344CB8AC3E}">
+        <p14:creationId xmlns:p14="http://schemas.microsoft.com/office/powerpoint/2010/main" val="4190487040"/>
       </p:ext>
     </p:extLst>
   </p:cSld>
@@ -5263,11 +5648,7 @@
             </a:r>
             <a:r>
               <a:rPr lang="pl-PL" sz="1600" b="1" dirty="0" smtClean="0"/>
-              <a:t> Object separately</a:t>
-            </a:r>
-            <a:r>
-              <a:rPr lang="pl-PL" sz="1600" b="1" dirty="0" smtClean="0"/>
-              <a:t>:</a:t>
+              <a:t> Object separately:</a:t>
             </a:r>
             <a:endParaRPr lang="pl-PL" sz="1600" dirty="0"/>
           </a:p>

</xml_diff>